<commit_message>
Update to ooxml embeding from bug #45018 from Yury
git-svn-id: https://svn.apache.org/repos/asf/poi/branches/ooxml@660945 13f79535-47bb-0310-9956-ffa450edef68
</commit_message>
<xml_diff>
--- a/src/ooxml/testcases/org/apache/poi/ooxml/data/PPTWithAttachments.pptx
+++ b/src/ooxml/testcases/org/apache/poi/ooxml/data/PPTWithAttachments.pptx
@@ -5,13 +5,14 @@
     <p:sldMasterId id="2147483648" r:id="rId1"/>
   </p:sldMasterIdLst>
   <p:notesMasterIdLst>
-    <p:notesMasterId r:id="rId3"/>
+    <p:notesMasterId r:id="rId4"/>
   </p:notesMasterIdLst>
   <p:handoutMasterIdLst>
-    <p:handoutMasterId r:id="rId4"/>
+    <p:handoutMasterId r:id="rId5"/>
   </p:handoutMasterIdLst>
   <p:sldIdLst>
     <p:sldId id="256" r:id="rId2"/>
+    <p:sldId id="257" r:id="rId3"/>
   </p:sldIdLst>
   <p:sldSz cx="9144000" cy="6858000" type="screen4x3"/>
   <p:notesSz cx="6858000" cy="9144000"/>
@@ -481,7 +482,7 @@
         <p:nvSpPr>
           <p:cNvPr id="3076" name="Rectangle 4"/>
           <p:cNvSpPr>
-            <a:spLocks noRot="1" noChangeArrowheads="1" noTextEdit="1"/>
+            <a:spLocks noGrp="1" noRot="1" noChangeAspect="1" noChangeArrowheads="1" noTextEdit="1"/>
           </p:cNvSpPr>
           <p:nvPr>
             <p:ph type="sldImg" idx="2"/>
@@ -920,7 +921,7 @@
         <p:nvSpPr>
           <p:cNvPr id="4098" name="Rectangle 2"/>
           <p:cNvSpPr>
-            <a:spLocks noRot="1" noChangeArrowheads="1" noTextEdit="1"/>
+            <a:spLocks noGrp="1" noRot="1" noChangeAspect="1" noChangeArrowheads="1" noTextEdit="1"/>
           </p:cNvSpPr>
           <p:nvPr>
             <p:ph type="sldImg"/>
@@ -4061,9 +4062,18 @@
           <a:lstStyle/>
           <a:p>
             <a:r>
-              <a:rPr lang="ru-RU"/>
-              <a:t>Иқтисодиёт, четырнадцать, zoic</a:t>
-            </a:r>
+              <a:rPr lang="ru-RU" dirty="0" err="1"/>
+              <a:t>Иқтисодиёт, </a:t>
+            </a:r>
+            <a:r>
+              <a:rPr lang="ru-RU" dirty="0"/>
+              <a:t>четырнадцать, </a:t>
+            </a:r>
+            <a:r>
+              <a:rPr lang="ru-RU" dirty="0" err="1"/>
+              <a:t>zoic</a:t>
+            </a:r>
+            <a:endParaRPr lang="ru-RU" dirty="0"/>
           </a:p>
         </p:txBody>
       </p:sp>
@@ -4134,42 +4144,48 @@
           <a:lstStyle/>
           <a:p>
             <a:r>
-              <a:rPr lang="ru-RU" i="1">
+              <a:rPr lang="ru-RU" i="1" dirty="0" err="1">
                 <a:hlinkClick r:id="rId4" action="ppaction://hlinkfile"/>
               </a:rPr>
               <a:t>биргина</a:t>
             </a:r>
             <a:r>
-              <a:rPr lang="en-US" i="1">
+              <a:rPr lang="en-US" i="1" dirty="0">
                 <a:hlinkClick r:id="rId4" action="ppaction://hlinkfile"/>
               </a:rPr>
               <a:t> </a:t>
             </a:r>
             <a:r>
-              <a:rPr lang="ru-RU" i="1">
+              <a:rPr lang="ru-RU" i="1" dirty="0" err="1">
                 <a:hlinkClick r:id="rId4" action="ppaction://hlinkfile"/>
               </a:rPr>
               <a:t>ўзи</a:t>
             </a:r>
             <a:r>
-              <a:rPr lang="en-US" i="1">
+              <a:rPr lang="en-US" i="1" dirty="0">
                 <a:hlinkClick r:id="rId4" action="ppaction://hlinkfile"/>
               </a:rPr>
               <a:t>, </a:t>
             </a:r>
             <a:r>
-              <a:rPr lang="ru-RU" i="1">
+              <a:rPr lang="ru-RU" i="1" dirty="0">
                 <a:hlinkClick r:id="rId4" action="ppaction://hlinkfile"/>
               </a:rPr>
               <a:t>один</a:t>
             </a:r>
             <a:r>
-              <a:rPr lang="en-US" i="1">
+              <a:rPr lang="en-US" i="1" dirty="0">
                 <a:hlinkClick r:id="rId4" action="ppaction://hlinkfile"/>
               </a:rPr>
-              <a:t>, ahold</a:t>
-            </a:r>
-            <a:endParaRPr lang="ru-RU" i="1">
+              <a:t>, </a:t>
+            </a:r>
+            <a:r>
+              <a:rPr lang="en-US" i="1" dirty="0" err="1">
+                <a:hlinkClick r:id="rId4" action="ppaction://hlinkfile"/>
+              </a:rPr>
+              <a:t>ahold</a:t>
+            </a:r>
+            <a:endParaRPr lang="ru-RU" i="1" dirty="0">
               <a:hlinkClick r:id="rId4" action="ppaction://hlinkfile"/>
             </a:endParaRPr>
           </a:p>
@@ -4436,6 +4452,136 @@
         <a:graphic>
           <a:graphicData uri="http://schemas.openxmlformats.org/drawingml/2006/compatibility">
             <com:legacyDrawing xmlns:com="http://schemas.openxmlformats.org/drawingml/2006/compatibility" spid="_x0000_s2056"/>
+          </a:graphicData>
+        </a:graphic>
+      </p:graphicFrame>
+    </p:spTree>
+  </p:cSld>
+  <p:clrMapOvr>
+    <a:masterClrMapping/>
+  </p:clrMapOvr>
+</p:sld>
+</file>
+
+<file path=ppt/slides/slide2.xml><?xml version="1.0" encoding="utf-8"?>
+<p:sld xmlns:a="http://schemas.openxmlformats.org/drawingml/2006/main" xmlns:r="http://schemas.openxmlformats.org/officeDocument/2006/relationships" xmlns:p="http://schemas.openxmlformats.org/presentationml/2006/main">
+  <p:cSld>
+    <p:spTree>
+      <p:nvGrpSpPr>
+        <p:cNvPr id="1" name=""/>
+        <p:cNvGrpSpPr/>
+        <p:nvPr/>
+      </p:nvGrpSpPr>
+      <p:grpSpPr>
+        <a:xfrm>
+          <a:off x="0" y="0"/>
+          <a:ext cx="0" cy="0"/>
+          <a:chOff x="0" y="0"/>
+          <a:chExt cx="0" cy="0"/>
+        </a:xfrm>
+      </p:grpSpPr>
+      <p:sp>
+        <p:nvSpPr>
+          <p:cNvPr id="2" name="Заголовок 1"/>
+          <p:cNvSpPr>
+            <a:spLocks noGrp="1"/>
+          </p:cNvSpPr>
+          <p:nvPr>
+            <p:ph type="title"/>
+          </p:nvPr>
+        </p:nvSpPr>
+        <p:spPr/>
+        <p:txBody>
+          <a:bodyPr/>
+          <a:lstStyle/>
+          <a:p>
+            <a:r>
+              <a:rPr lang="en-US" dirty="0" smtClean="0"/>
+              <a:t>Here we test embeddings</a:t>
+            </a:r>
+            <a:endParaRPr lang="ru-RU" dirty="0"/>
+          </a:p>
+        </p:txBody>
+      </p:sp>
+      <p:graphicFrame>
+        <p:nvGraphicFramePr>
+          <p:cNvPr id="4" name="Содержимое 3"/>
+          <p:cNvGraphicFramePr>
+            <a:graphicFrameLocks noChangeAspect="1"/>
+          </p:cNvGraphicFramePr>
+          <p:nvPr>
+            <p:ph idx="1"/>
+          </p:nvPr>
+        </p:nvGraphicFramePr>
+        <p:xfrm>
+          <a:off x="1535113" y="1828800"/>
+          <a:ext cx="2268537" cy="1098550"/>
+        </p:xfrm>
+        <a:graphic>
+          <a:graphicData uri="http://schemas.openxmlformats.org/presentationml/2006/ole">
+            <p:oleObj spid="_x0000_s17410" name="Document" r:id="rId3" imgW="2295859" imgH="1110514" progId="Word.Document.8">
+              <p:embed/>
+            </p:oleObj>
+          </a:graphicData>
+        </a:graphic>
+      </p:graphicFrame>
+      <p:graphicFrame>
+        <p:nvGraphicFramePr>
+          <p:cNvPr id="6" name="Объект 5"/>
+          <p:cNvGraphicFramePr>
+            <a:graphicFrameLocks noChangeAspect="1"/>
+          </p:cNvGraphicFramePr>
+          <p:nvPr/>
+        </p:nvGraphicFramePr>
+        <p:xfrm>
+          <a:off x="785786" y="3214686"/>
+          <a:ext cx="3048000" cy="2286000"/>
+        </p:xfrm>
+        <a:graphic>
+          <a:graphicData uri="http://schemas.openxmlformats.org/presentationml/2006/ole">
+            <p:oleObj spid="_x0000_s17412" name="Bitmap Image" r:id="rId4" imgW="3048426" imgH="2285714" progId="PBrush">
+              <p:embed/>
+            </p:oleObj>
+          </a:graphicData>
+        </a:graphic>
+      </p:graphicFrame>
+      <p:graphicFrame>
+        <p:nvGraphicFramePr>
+          <p:cNvPr id="7" name="Объект 6"/>
+          <p:cNvGraphicFramePr>
+            <a:graphicFrameLocks noChangeAspect="1"/>
+          </p:cNvGraphicFramePr>
+          <p:nvPr/>
+        </p:nvGraphicFramePr>
+        <p:xfrm>
+          <a:off x="4630738" y="3192463"/>
+          <a:ext cx="3057525" cy="2295525"/>
+        </p:xfrm>
+        <a:graphic>
+          <a:graphicData uri="http://schemas.openxmlformats.org/presentationml/2006/ole">
+            <p:oleObj spid="_x0000_s17413" name="Worksheet" r:id="rId5" imgW="3057428" imgH="2295672" progId="Excel.Sheet.8">
+              <p:embed/>
+            </p:oleObj>
+          </a:graphicData>
+        </a:graphic>
+      </p:graphicFrame>
+      <p:graphicFrame>
+        <p:nvGraphicFramePr>
+          <p:cNvPr id="9" name="Объект 8"/>
+          <p:cNvGraphicFramePr>
+            <a:graphicFrameLocks noChangeAspect="1"/>
+          </p:cNvGraphicFramePr>
+          <p:nvPr/>
+        </p:nvGraphicFramePr>
+        <p:xfrm>
+          <a:off x="5146675" y="1931988"/>
+          <a:ext cx="1798638" cy="749300"/>
+        </p:xfrm>
+        <a:graphic>
+          <a:graphicData uri="http://schemas.openxmlformats.org/presentationml/2006/ole">
+            <p:oleObj spid="_x0000_s17415" name="Лист" r:id="rId6" imgW="1838228" imgH="771510" progId="Excel.Sheet.12">
+              <p:embed/>
+            </p:oleObj>
           </a:graphicData>
         </a:graphic>
       </p:graphicFrame>

</xml_diff>